<commit_message>
Updated figure for prisma flowchart
</commit_message>
<xml_diff>
--- a/data/Prisma_flowchart.pptx
+++ b/data/Prisma_flowchart.pptx
@@ -243,7 +243,7 @@
           <a:p>
             <a:fld id="{448ABB75-5DC1-1548-84C7-684F967F9B0B}" type="datetimeFigureOut">
               <a:rPr lang="es-ES_tradnl" smtClean="0"/>
-              <a:t>13/10/20</a:t>
+              <a:t>8/7/21</a:t>
             </a:fld>
             <a:endParaRPr lang="es-ES_tradnl"/>
           </a:p>
@@ -413,7 +413,7 @@
           <a:p>
             <a:fld id="{448ABB75-5DC1-1548-84C7-684F967F9B0B}" type="datetimeFigureOut">
               <a:rPr lang="es-ES_tradnl" smtClean="0"/>
-              <a:t>13/10/20</a:t>
+              <a:t>8/7/21</a:t>
             </a:fld>
             <a:endParaRPr lang="es-ES_tradnl"/>
           </a:p>
@@ -593,7 +593,7 @@
           <a:p>
             <a:fld id="{448ABB75-5DC1-1548-84C7-684F967F9B0B}" type="datetimeFigureOut">
               <a:rPr lang="es-ES_tradnl" smtClean="0"/>
-              <a:t>13/10/20</a:t>
+              <a:t>8/7/21</a:t>
             </a:fld>
             <a:endParaRPr lang="es-ES_tradnl"/>
           </a:p>
@@ -763,7 +763,7 @@
           <a:p>
             <a:fld id="{448ABB75-5DC1-1548-84C7-684F967F9B0B}" type="datetimeFigureOut">
               <a:rPr lang="es-ES_tradnl" smtClean="0"/>
-              <a:t>13/10/20</a:t>
+              <a:t>8/7/21</a:t>
             </a:fld>
             <a:endParaRPr lang="es-ES_tradnl"/>
           </a:p>
@@ -1007,7 +1007,7 @@
           <a:p>
             <a:fld id="{448ABB75-5DC1-1548-84C7-684F967F9B0B}" type="datetimeFigureOut">
               <a:rPr lang="es-ES_tradnl" smtClean="0"/>
-              <a:t>13/10/20</a:t>
+              <a:t>8/7/21</a:t>
             </a:fld>
             <a:endParaRPr lang="es-ES_tradnl"/>
           </a:p>
@@ -1239,7 +1239,7 @@
           <a:p>
             <a:fld id="{448ABB75-5DC1-1548-84C7-684F967F9B0B}" type="datetimeFigureOut">
               <a:rPr lang="es-ES_tradnl" smtClean="0"/>
-              <a:t>13/10/20</a:t>
+              <a:t>8/7/21</a:t>
             </a:fld>
             <a:endParaRPr lang="es-ES_tradnl"/>
           </a:p>
@@ -1606,7 +1606,7 @@
           <a:p>
             <a:fld id="{448ABB75-5DC1-1548-84C7-684F967F9B0B}" type="datetimeFigureOut">
               <a:rPr lang="es-ES_tradnl" smtClean="0"/>
-              <a:t>13/10/20</a:t>
+              <a:t>8/7/21</a:t>
             </a:fld>
             <a:endParaRPr lang="es-ES_tradnl"/>
           </a:p>
@@ -1724,7 +1724,7 @@
           <a:p>
             <a:fld id="{448ABB75-5DC1-1548-84C7-684F967F9B0B}" type="datetimeFigureOut">
               <a:rPr lang="es-ES_tradnl" smtClean="0"/>
-              <a:t>13/10/20</a:t>
+              <a:t>8/7/21</a:t>
             </a:fld>
             <a:endParaRPr lang="es-ES_tradnl"/>
           </a:p>
@@ -1819,7 +1819,7 @@
           <a:p>
             <a:fld id="{448ABB75-5DC1-1548-84C7-684F967F9B0B}" type="datetimeFigureOut">
               <a:rPr lang="es-ES_tradnl" smtClean="0"/>
-              <a:t>13/10/20</a:t>
+              <a:t>8/7/21</a:t>
             </a:fld>
             <a:endParaRPr lang="es-ES_tradnl"/>
           </a:p>
@@ -2096,7 +2096,7 @@
           <a:p>
             <a:fld id="{448ABB75-5DC1-1548-84C7-684F967F9B0B}" type="datetimeFigureOut">
               <a:rPr lang="es-ES_tradnl" smtClean="0"/>
-              <a:t>13/10/20</a:t>
+              <a:t>8/7/21</a:t>
             </a:fld>
             <a:endParaRPr lang="es-ES_tradnl"/>
           </a:p>
@@ -2353,7 +2353,7 @@
           <a:p>
             <a:fld id="{448ABB75-5DC1-1548-84C7-684F967F9B0B}" type="datetimeFigureOut">
               <a:rPr lang="es-ES_tradnl" smtClean="0"/>
-              <a:t>13/10/20</a:t>
+              <a:t>8/7/21</a:t>
             </a:fld>
             <a:endParaRPr lang="es-ES_tradnl"/>
           </a:p>
@@ -2569,7 +2569,7 @@
           <a:p>
             <a:fld id="{448ABB75-5DC1-1548-84C7-684F967F9B0B}" type="datetimeFigureOut">
               <a:rPr lang="es-ES_tradnl" smtClean="0"/>
-              <a:t>13/10/20</a:t>
+              <a:t>8/7/21</a:t>
             </a:fld>
             <a:endParaRPr lang="es-ES_tradnl"/>
           </a:p>
@@ -3226,7 +3226,7 @@
                 <a:rPr lang="en-GB" dirty="0">
                   <a:latin typeface="DINOT" panose="020B0504020101020102" pitchFamily="34" charset="77"/>
                 </a:rPr>
-                <a:t>n = 1605</a:t>
+                <a:t>n = 1829</a:t>
               </a:r>
             </a:p>
           </p:txBody>
@@ -3284,7 +3284,7 @@
                 <a:rPr lang="en-GB" dirty="0">
                   <a:latin typeface="DINOT" panose="020B0504020101020102" pitchFamily="34" charset="77"/>
                 </a:rPr>
-                <a:t>n = 1371</a:t>
+                <a:t>n = 1591</a:t>
               </a:r>
             </a:p>
           </p:txBody>
@@ -3342,7 +3342,7 @@
                 <a:rPr lang="en-GB" dirty="0">
                   <a:latin typeface="DINOT" panose="020B0504020101020102" pitchFamily="34" charset="77"/>
                 </a:rPr>
-                <a:t>n = 1371</a:t>
+                <a:t>n = 1591</a:t>
               </a:r>
             </a:p>
           </p:txBody>
@@ -3477,7 +3477,7 @@
                 <a:rPr lang="en-GB" dirty="0">
                   <a:latin typeface="DINOT" panose="020B0504020101020102" pitchFamily="34" charset="77"/>
                 </a:rPr>
-                <a:t>Records excluded based on title and abstract (n = 1122)</a:t>
+                <a:t>Records excluded based on title and abstract (n = 1331)</a:t>
               </a:r>
             </a:p>
             <a:p>
@@ -3595,7 +3595,7 @@
                 <a:rPr lang="en-GB" dirty="0">
                   <a:latin typeface="DINOT" panose="020B0504020101020102" pitchFamily="34" charset="77"/>
                 </a:rPr>
-                <a:t>n = 229</a:t>
+                <a:t>n = 260</a:t>
               </a:r>
             </a:p>
           </p:txBody>
@@ -3730,7 +3730,7 @@
                 <a:rPr lang="en-GB" dirty="0">
                   <a:latin typeface="DINOT" panose="020B0504020101020102" pitchFamily="34" charset="77"/>
                 </a:rPr>
-                <a:t>Full text articles excluded for following reasons (n = 137):</a:t>
+                <a:t>Full text articles excluded for following reasons (n = 160):</a:t>
               </a:r>
             </a:p>
             <a:p>
@@ -3742,7 +3742,7 @@
                 <a:rPr lang="en-GB" dirty="0">
                   <a:latin typeface="DINOT" panose="020B0504020101020102" pitchFamily="34" charset="77"/>
                 </a:rPr>
-                <a:t>Not an implemented AR application (n = 54)</a:t>
+                <a:t>Not an implemented AR application (n = 65)</a:t>
               </a:r>
             </a:p>
             <a:p>
@@ -3754,7 +3754,7 @@
                 <a:rPr lang="en-GB" dirty="0">
                   <a:latin typeface="DINOT" panose="020B0504020101020102" pitchFamily="34" charset="77"/>
                 </a:rPr>
-                <a:t>Not for education (n = 35)</a:t>
+                <a:t>Not for education (n = 44)</a:t>
               </a:r>
             </a:p>
             <a:p>
@@ -3766,7 +3766,7 @@
                 <a:rPr lang="en-GB" dirty="0">
                   <a:latin typeface="DINOT" panose="020B0504020101020102" pitchFamily="34" charset="77"/>
                 </a:rPr>
-                <a:t>Not interactive, collaborative or multiuser (n = 25)</a:t>
+                <a:t>Not interactive, collaborative or multiuser (n = 28)</a:t>
               </a:r>
             </a:p>
             <a:p>
@@ -3863,7 +3863,7 @@
                 <a:rPr lang="en-GB" dirty="0">
                   <a:latin typeface="DINOT" panose="020B0504020101020102" pitchFamily="34" charset="77"/>
                 </a:rPr>
-                <a:t>n = 92</a:t>
+                <a:t>n = 100</a:t>
               </a:r>
             </a:p>
           </p:txBody>

</xml_diff>

<commit_message>
prepare for update with 2023 data
</commit_message>
<xml_diff>
--- a/data/Prisma_flowchart.pptx
+++ b/data/Prisma_flowchart.pptx
@@ -243,7 +243,7 @@
           <a:p>
             <a:fld id="{448ABB75-5DC1-1548-84C7-684F967F9B0B}" type="datetimeFigureOut">
               <a:rPr lang="es-ES_tradnl" smtClean="0"/>
-              <a:t>8/7/21</a:t>
+              <a:t>13/10/21</a:t>
             </a:fld>
             <a:endParaRPr lang="es-ES_tradnl"/>
           </a:p>
@@ -413,7 +413,7 @@
           <a:p>
             <a:fld id="{448ABB75-5DC1-1548-84C7-684F967F9B0B}" type="datetimeFigureOut">
               <a:rPr lang="es-ES_tradnl" smtClean="0"/>
-              <a:t>8/7/21</a:t>
+              <a:t>13/10/21</a:t>
             </a:fld>
             <a:endParaRPr lang="es-ES_tradnl"/>
           </a:p>
@@ -593,7 +593,7 @@
           <a:p>
             <a:fld id="{448ABB75-5DC1-1548-84C7-684F967F9B0B}" type="datetimeFigureOut">
               <a:rPr lang="es-ES_tradnl" smtClean="0"/>
-              <a:t>8/7/21</a:t>
+              <a:t>13/10/21</a:t>
             </a:fld>
             <a:endParaRPr lang="es-ES_tradnl"/>
           </a:p>
@@ -763,7 +763,7 @@
           <a:p>
             <a:fld id="{448ABB75-5DC1-1548-84C7-684F967F9B0B}" type="datetimeFigureOut">
               <a:rPr lang="es-ES_tradnl" smtClean="0"/>
-              <a:t>8/7/21</a:t>
+              <a:t>13/10/21</a:t>
             </a:fld>
             <a:endParaRPr lang="es-ES_tradnl"/>
           </a:p>
@@ -1007,7 +1007,7 @@
           <a:p>
             <a:fld id="{448ABB75-5DC1-1548-84C7-684F967F9B0B}" type="datetimeFigureOut">
               <a:rPr lang="es-ES_tradnl" smtClean="0"/>
-              <a:t>8/7/21</a:t>
+              <a:t>13/10/21</a:t>
             </a:fld>
             <a:endParaRPr lang="es-ES_tradnl"/>
           </a:p>
@@ -1239,7 +1239,7 @@
           <a:p>
             <a:fld id="{448ABB75-5DC1-1548-84C7-684F967F9B0B}" type="datetimeFigureOut">
               <a:rPr lang="es-ES_tradnl" smtClean="0"/>
-              <a:t>8/7/21</a:t>
+              <a:t>13/10/21</a:t>
             </a:fld>
             <a:endParaRPr lang="es-ES_tradnl"/>
           </a:p>
@@ -1606,7 +1606,7 @@
           <a:p>
             <a:fld id="{448ABB75-5DC1-1548-84C7-684F967F9B0B}" type="datetimeFigureOut">
               <a:rPr lang="es-ES_tradnl" smtClean="0"/>
-              <a:t>8/7/21</a:t>
+              <a:t>13/10/21</a:t>
             </a:fld>
             <a:endParaRPr lang="es-ES_tradnl"/>
           </a:p>
@@ -1724,7 +1724,7 @@
           <a:p>
             <a:fld id="{448ABB75-5DC1-1548-84C7-684F967F9B0B}" type="datetimeFigureOut">
               <a:rPr lang="es-ES_tradnl" smtClean="0"/>
-              <a:t>8/7/21</a:t>
+              <a:t>13/10/21</a:t>
             </a:fld>
             <a:endParaRPr lang="es-ES_tradnl"/>
           </a:p>
@@ -1819,7 +1819,7 @@
           <a:p>
             <a:fld id="{448ABB75-5DC1-1548-84C7-684F967F9B0B}" type="datetimeFigureOut">
               <a:rPr lang="es-ES_tradnl" smtClean="0"/>
-              <a:t>8/7/21</a:t>
+              <a:t>13/10/21</a:t>
             </a:fld>
             <a:endParaRPr lang="es-ES_tradnl"/>
           </a:p>
@@ -2096,7 +2096,7 @@
           <a:p>
             <a:fld id="{448ABB75-5DC1-1548-84C7-684F967F9B0B}" type="datetimeFigureOut">
               <a:rPr lang="es-ES_tradnl" smtClean="0"/>
-              <a:t>8/7/21</a:t>
+              <a:t>13/10/21</a:t>
             </a:fld>
             <a:endParaRPr lang="es-ES_tradnl"/>
           </a:p>
@@ -2353,7 +2353,7 @@
           <a:p>
             <a:fld id="{448ABB75-5DC1-1548-84C7-684F967F9B0B}" type="datetimeFigureOut">
               <a:rPr lang="es-ES_tradnl" smtClean="0"/>
-              <a:t>8/7/21</a:t>
+              <a:t>13/10/21</a:t>
             </a:fld>
             <a:endParaRPr lang="es-ES_tradnl"/>
           </a:p>
@@ -2569,7 +2569,7 @@
           <a:p>
             <a:fld id="{448ABB75-5DC1-1548-84C7-684F967F9B0B}" type="datetimeFigureOut">
               <a:rPr lang="es-ES_tradnl" smtClean="0"/>
-              <a:t>8/7/21</a:t>
+              <a:t>13/10/21</a:t>
             </a:fld>
             <a:endParaRPr lang="es-ES_tradnl"/>
           </a:p>
@@ -2976,10 +2976,10 @@
       </p:grpSpPr>
       <p:grpSp>
         <p:nvGrpSpPr>
-          <p:cNvPr id="2" name="Group 1">
+          <p:cNvPr id="51" name="Group 50">
             <a:extLst>
               <a:ext uri="{FF2B5EF4-FFF2-40B4-BE49-F238E27FC236}">
-                <a16:creationId xmlns:a16="http://schemas.microsoft.com/office/drawing/2014/main" id="{B3A512CE-1CF7-BC4B-8B6A-948436D9D3EA}"/>
+                <a16:creationId xmlns:a16="http://schemas.microsoft.com/office/drawing/2014/main" id="{5BD8392A-5800-BC4C-882D-099E90D05887}"/>
               </a:ext>
             </a:extLst>
           </p:cNvPr>
@@ -2988,14 +2988,11 @@
         </p:nvGrpSpPr>
         <p:grpSpPr>
           <a:xfrm>
-            <a:off x="278609" y="273151"/>
-            <a:ext cx="7841825" cy="8101704"/>
-            <a:chOff x="1594274" y="352650"/>
-            <a:chExt cx="7841825" cy="8101704"/>
+            <a:off x="1033558" y="43890"/>
+            <a:ext cx="10519721" cy="7283845"/>
+            <a:chOff x="1033558" y="43890"/>
+            <a:chExt cx="10519721" cy="7283845"/>
           </a:xfrm>
-          <a:solidFill>
-            <a:schemeClr val="bg1"/>
-          </a:solidFill>
         </p:grpSpPr>
         <p:sp>
           <p:nvSpPr>
@@ -3010,14 +3007,16 @@
             <p:nvPr/>
           </p:nvSpPr>
           <p:spPr>
-            <a:xfrm rot="16200000">
-              <a:off x="987476" y="1010949"/>
+            <a:xfrm>
+              <a:off x="2128783" y="47049"/>
               <a:ext cx="1687398" cy="370800"/>
             </a:xfrm>
             <a:prstGeom prst="rect">
               <a:avLst/>
             </a:prstGeom>
-            <a:grpFill/>
+            <a:solidFill>
+              <a:schemeClr val="bg1"/>
+            </a:solidFill>
           </p:spPr>
           <p:txBody>
             <a:bodyPr wrap="square" rtlCol="0">
@@ -3048,14 +3047,16 @@
             <p:nvPr/>
           </p:nvSpPr>
           <p:spPr>
-            <a:xfrm rot="16200000">
-              <a:off x="1150065" y="3506699"/>
+            <a:xfrm>
+              <a:off x="7328229" y="43890"/>
               <a:ext cx="1363688" cy="369332"/>
             </a:xfrm>
             <a:prstGeom prst="rect">
               <a:avLst/>
             </a:prstGeom>
-            <a:grpFill/>
+            <a:solidFill>
+              <a:schemeClr val="bg1"/>
+            </a:solidFill>
           </p:spPr>
           <p:txBody>
             <a:bodyPr wrap="square" rtlCol="0">
@@ -3087,13 +3088,15 @@
           </p:nvSpPr>
           <p:spPr>
             <a:xfrm rot="16200000">
-              <a:off x="1203034" y="6013731"/>
+              <a:off x="589349" y="2942611"/>
               <a:ext cx="1257751" cy="369332"/>
             </a:xfrm>
             <a:prstGeom prst="rect">
               <a:avLst/>
             </a:prstGeom>
-            <a:grpFill/>
+            <a:solidFill>
+              <a:schemeClr val="bg1"/>
+            </a:solidFill>
           </p:spPr>
           <p:txBody>
             <a:bodyPr wrap="square" rtlCol="0">
@@ -3113,44 +3116,6 @@
         </p:sp>
         <p:sp>
           <p:nvSpPr>
-            <p:cNvPr id="7" name="TextBox 6">
-              <a:extLst>
-                <a:ext uri="{FF2B5EF4-FFF2-40B4-BE49-F238E27FC236}">
-                  <a16:creationId xmlns:a16="http://schemas.microsoft.com/office/drawing/2014/main" id="{32F8E894-7168-DE48-8CFC-EA44AD543387}"/>
-                </a:ext>
-              </a:extLst>
-            </p:cNvPr>
-            <p:cNvSpPr txBox="1"/>
-            <p:nvPr/>
-          </p:nvSpPr>
-          <p:spPr>
-            <a:xfrm rot="16200000">
-              <a:off x="1150065" y="7640813"/>
-              <a:ext cx="1257750" cy="369332"/>
-            </a:xfrm>
-            <a:prstGeom prst="rect">
-              <a:avLst/>
-            </a:prstGeom>
-            <a:grpFill/>
-          </p:spPr>
-          <p:txBody>
-            <a:bodyPr wrap="square" rtlCol="0">
-              <a:spAutoFit/>
-            </a:bodyPr>
-            <a:lstStyle/>
-            <a:p>
-              <a:pPr algn="ctr"/>
-              <a:r>
-                <a:rPr lang="en-GB" dirty="0">
-                  <a:latin typeface="DINOT" panose="020B0504020101020102" pitchFamily="34" charset="77"/>
-                </a:rPr>
-                <a:t>Included</a:t>
-              </a:r>
-            </a:p>
-          </p:txBody>
-        </p:sp>
-        <p:sp>
-          <p:nvSpPr>
             <p:cNvPr id="8" name="TextBox 7">
               <a:extLst>
                 <a:ext uri="{FF2B5EF4-FFF2-40B4-BE49-F238E27FC236}">
@@ -3163,13 +3128,15 @@
           </p:nvSpPr>
           <p:spPr>
             <a:xfrm>
-              <a:off x="2326193" y="457685"/>
+              <a:off x="1582028" y="449623"/>
               <a:ext cx="2780908" cy="1477328"/>
             </a:xfrm>
             <a:prstGeom prst="rect">
               <a:avLst/>
             </a:prstGeom>
-            <a:grpFill/>
+            <a:solidFill>
+              <a:schemeClr val="bg1"/>
+            </a:solidFill>
             <a:ln>
               <a:solidFill>
                 <a:schemeClr val="tx1"/>
@@ -3245,13 +3212,15 @@
           </p:nvSpPr>
           <p:spPr>
             <a:xfrm>
-              <a:off x="2326193" y="2322458"/>
+              <a:off x="4839578" y="588121"/>
               <a:ext cx="2780908" cy="1200329"/>
             </a:xfrm>
             <a:prstGeom prst="rect">
               <a:avLst/>
             </a:prstGeom>
-            <a:grpFill/>
+            <a:solidFill>
+              <a:schemeClr val="bg1"/>
+            </a:solidFill>
             <a:ln>
               <a:solidFill>
                 <a:schemeClr val="tx1"/>
@@ -3303,13 +3272,15 @@
           </p:nvSpPr>
           <p:spPr>
             <a:xfrm>
-              <a:off x="2326193" y="3903688"/>
+              <a:off x="8291998" y="726620"/>
               <a:ext cx="2780908" cy="923330"/>
             </a:xfrm>
             <a:prstGeom prst="rect">
               <a:avLst/>
             </a:prstGeom>
-            <a:grpFill/>
+            <a:solidFill>
+              <a:schemeClr val="bg1"/>
+            </a:solidFill>
             <a:ln>
               <a:solidFill>
                 <a:schemeClr val="tx1"/>
@@ -3358,18 +3329,22 @@
             </p:cNvPr>
             <p:cNvCxnSpPr>
               <a:cxnSpLocks/>
+              <a:stCxn id="8" idx="3"/>
+              <a:endCxn id="9" idx="1"/>
             </p:cNvCxnSpPr>
             <p:nvPr/>
           </p:nvCxnSpPr>
           <p:spPr>
-            <a:xfrm>
-              <a:off x="3717329" y="1935013"/>
-              <a:ext cx="0" cy="387445"/>
+            <a:xfrm flipV="1">
+              <a:off x="4362936" y="1188286"/>
+              <a:ext cx="476642" cy="1"/>
             </a:xfrm>
             <a:prstGeom prst="straightConnector1">
               <a:avLst/>
             </a:prstGeom>
-            <a:grpFill/>
+            <a:solidFill>
+              <a:schemeClr val="bg1"/>
+            </a:solidFill>
             <a:ln w="28575">
               <a:solidFill>
                 <a:schemeClr val="tx1"/>
@@ -3403,20 +3378,22 @@
             </p:cNvPr>
             <p:cNvCxnSpPr>
               <a:cxnSpLocks/>
-              <a:stCxn id="9" idx="2"/>
-              <a:endCxn id="10" idx="0"/>
+              <a:stCxn id="9" idx="3"/>
+              <a:endCxn id="10" idx="1"/>
             </p:cNvCxnSpPr>
             <p:nvPr/>
           </p:nvCxnSpPr>
           <p:spPr>
-            <a:xfrm>
-              <a:off x="3716647" y="3522787"/>
-              <a:ext cx="0" cy="380901"/>
+            <a:xfrm flipV="1">
+              <a:off x="7620486" y="1188285"/>
+              <a:ext cx="671512" cy="1"/>
             </a:xfrm>
             <a:prstGeom prst="straightConnector1">
               <a:avLst/>
             </a:prstGeom>
-            <a:grpFill/>
+            <a:solidFill>
+              <a:schemeClr val="bg1"/>
+            </a:solidFill>
             <a:ln w="28575">
               <a:solidFill>
                 <a:schemeClr val="tx1"/>
@@ -3453,13 +3430,15 @@
           </p:nvSpPr>
           <p:spPr>
             <a:xfrm>
-              <a:off x="5694445" y="3771556"/>
+              <a:off x="7811625" y="2575592"/>
               <a:ext cx="3741654" cy="1200329"/>
             </a:xfrm>
             <a:prstGeom prst="rect">
               <a:avLst/>
             </a:prstGeom>
-            <a:grpFill/>
+            <a:solidFill>
+              <a:schemeClr val="bg1"/>
+            </a:solidFill>
             <a:ln>
               <a:solidFill>
                 <a:schemeClr val="tx1"/>
@@ -3508,18 +3487,22 @@
             </p:cNvPr>
             <p:cNvCxnSpPr>
               <a:cxnSpLocks/>
+              <a:stCxn id="10" idx="2"/>
+              <a:endCxn id="16" idx="0"/>
             </p:cNvCxnSpPr>
             <p:nvPr/>
           </p:nvCxnSpPr>
           <p:spPr>
             <a:xfrm>
-              <a:off x="5099618" y="4385436"/>
-              <a:ext cx="594827" cy="0"/>
+              <a:off x="9682452" y="1649950"/>
+              <a:ext cx="0" cy="925642"/>
             </a:xfrm>
             <a:prstGeom prst="straightConnector1">
               <a:avLst/>
             </a:prstGeom>
-            <a:grpFill/>
+            <a:solidFill>
+              <a:schemeClr val="bg1"/>
+            </a:solidFill>
             <a:ln w="28575">
               <a:solidFill>
                 <a:schemeClr val="tx1"/>
@@ -3556,13 +3539,15 @@
           </p:nvSpPr>
           <p:spPr>
             <a:xfrm>
-              <a:off x="2326193" y="5534611"/>
+              <a:off x="1599468" y="2555824"/>
               <a:ext cx="2780908" cy="1200329"/>
             </a:xfrm>
             <a:prstGeom prst="rect">
               <a:avLst/>
             </a:prstGeom>
-            <a:grpFill/>
+            <a:solidFill>
+              <a:schemeClr val="bg1"/>
+            </a:solidFill>
             <a:ln>
               <a:solidFill>
                 <a:schemeClr val="tx1"/>
@@ -3600,98 +3585,6 @@
             </a:p>
           </p:txBody>
         </p:sp>
-        <p:cxnSp>
-          <p:nvCxnSpPr>
-            <p:cNvPr id="21" name="Straight Arrow Connector 20">
-              <a:extLst>
-                <a:ext uri="{FF2B5EF4-FFF2-40B4-BE49-F238E27FC236}">
-                  <a16:creationId xmlns:a16="http://schemas.microsoft.com/office/drawing/2014/main" id="{ABE47524-8133-A748-989C-C384AFCB8241}"/>
-                </a:ext>
-              </a:extLst>
-            </p:cNvPr>
-            <p:cNvCxnSpPr>
-              <a:cxnSpLocks/>
-              <a:stCxn id="10" idx="2"/>
-              <a:endCxn id="20" idx="0"/>
-            </p:cNvCxnSpPr>
-            <p:nvPr/>
-          </p:nvCxnSpPr>
-          <p:spPr>
-            <a:xfrm>
-              <a:off x="3716647" y="4827018"/>
-              <a:ext cx="0" cy="707593"/>
-            </a:xfrm>
-            <a:prstGeom prst="straightConnector1">
-              <a:avLst/>
-            </a:prstGeom>
-            <a:grpFill/>
-            <a:ln w="28575">
-              <a:solidFill>
-                <a:schemeClr val="tx1"/>
-              </a:solidFill>
-              <a:tailEnd type="triangle"/>
-            </a:ln>
-          </p:spPr>
-          <p:style>
-            <a:lnRef idx="1">
-              <a:schemeClr val="accent1"/>
-            </a:lnRef>
-            <a:fillRef idx="0">
-              <a:schemeClr val="accent1"/>
-            </a:fillRef>
-            <a:effectRef idx="0">
-              <a:schemeClr val="accent1"/>
-            </a:effectRef>
-            <a:fontRef idx="minor">
-              <a:schemeClr val="tx1"/>
-            </a:fontRef>
-          </p:style>
-        </p:cxnSp>
-        <p:cxnSp>
-          <p:nvCxnSpPr>
-            <p:cNvPr id="25" name="Straight Arrow Connector 24">
-              <a:extLst>
-                <a:ext uri="{FF2B5EF4-FFF2-40B4-BE49-F238E27FC236}">
-                  <a16:creationId xmlns:a16="http://schemas.microsoft.com/office/drawing/2014/main" id="{53C027A0-2364-2F4A-8102-1271CF135E13}"/>
-                </a:ext>
-              </a:extLst>
-            </p:cNvPr>
-            <p:cNvCxnSpPr>
-              <a:cxnSpLocks/>
-            </p:cNvCxnSpPr>
-            <p:nvPr/>
-          </p:nvCxnSpPr>
-          <p:spPr>
-            <a:xfrm>
-              <a:off x="5107101" y="5829066"/>
-              <a:ext cx="587345" cy="0"/>
-            </a:xfrm>
-            <a:prstGeom prst="straightConnector1">
-              <a:avLst/>
-            </a:prstGeom>
-            <a:grpFill/>
-            <a:ln w="28575">
-              <a:solidFill>
-                <a:schemeClr val="tx1"/>
-              </a:solidFill>
-              <a:tailEnd type="triangle"/>
-            </a:ln>
-          </p:spPr>
-          <p:style>
-            <a:lnRef idx="1">
-              <a:schemeClr val="accent1"/>
-            </a:lnRef>
-            <a:fillRef idx="0">
-              <a:schemeClr val="accent1"/>
-            </a:fillRef>
-            <a:effectRef idx="0">
-              <a:schemeClr val="accent1"/>
-            </a:effectRef>
-            <a:fontRef idx="minor">
-              <a:schemeClr val="tx1"/>
-            </a:fontRef>
-          </p:style>
-        </p:cxnSp>
         <p:sp>
           <p:nvSpPr>
             <p:cNvPr id="26" name="TextBox 25">
@@ -3706,13 +3599,15 @@
           </p:nvSpPr>
           <p:spPr>
             <a:xfrm>
-              <a:off x="5694445" y="5257612"/>
+              <a:off x="7811642" y="4188414"/>
               <a:ext cx="3741637" cy="3139321"/>
             </a:xfrm>
             <a:prstGeom prst="rect">
               <a:avLst/>
             </a:prstGeom>
-            <a:grpFill/>
+            <a:solidFill>
+              <a:schemeClr val="bg1"/>
+            </a:solidFill>
             <a:ln>
               <a:solidFill>
                 <a:schemeClr val="tx1"/>
@@ -3824,13 +3719,15 @@
           </p:nvSpPr>
           <p:spPr>
             <a:xfrm>
-              <a:off x="2326193" y="7196604"/>
+              <a:off x="1596316" y="4620675"/>
               <a:ext cx="2780908" cy="1200329"/>
             </a:xfrm>
             <a:prstGeom prst="rect">
               <a:avLst/>
             </a:prstGeom>
-            <a:grpFill/>
+            <a:solidFill>
+              <a:schemeClr val="bg1"/>
+            </a:solidFill>
             <a:ln>
               <a:solidFill>
                 <a:schemeClr val="tx1"/>
@@ -3885,14 +3782,16 @@
             <p:nvPr/>
           </p:nvCxnSpPr>
           <p:spPr>
-            <a:xfrm>
-              <a:off x="3716647" y="6734940"/>
-              <a:ext cx="0" cy="461664"/>
+            <a:xfrm flipH="1">
+              <a:off x="2986770" y="3756153"/>
+              <a:ext cx="3152" cy="864522"/>
             </a:xfrm>
             <a:prstGeom prst="straightConnector1">
               <a:avLst/>
             </a:prstGeom>
-            <a:grpFill/>
+            <a:solidFill>
+              <a:schemeClr val="bg1"/>
+            </a:solidFill>
             <a:ln w="28575">
               <a:solidFill>
                 <a:schemeClr val="tx1"/>
@@ -3929,13 +3828,15 @@
           </p:nvSpPr>
           <p:spPr>
             <a:xfrm rot="16200000">
-              <a:off x="1201565" y="7640813"/>
+              <a:off x="589349" y="5007463"/>
               <a:ext cx="1257750" cy="369332"/>
             </a:xfrm>
             <a:prstGeom prst="rect">
               <a:avLst/>
             </a:prstGeom>
-            <a:grpFill/>
+            <a:solidFill>
+              <a:schemeClr val="bg1"/>
+            </a:solidFill>
           </p:spPr>
           <p:txBody>
             <a:bodyPr wrap="square" rtlCol="0">
@@ -3953,6 +3854,95 @@
             </a:p>
           </p:txBody>
         </p:sp>
+        <p:cxnSp>
+          <p:nvCxnSpPr>
+            <p:cNvPr id="37" name="Elbow Connector 36">
+              <a:extLst>
+                <a:ext uri="{FF2B5EF4-FFF2-40B4-BE49-F238E27FC236}">
+                  <a16:creationId xmlns:a16="http://schemas.microsoft.com/office/drawing/2014/main" id="{7FF58DB3-B153-8C45-B2D8-2858E73306AA}"/>
+                </a:ext>
+              </a:extLst>
+            </p:cNvPr>
+            <p:cNvCxnSpPr>
+              <a:stCxn id="10" idx="2"/>
+              <a:endCxn id="20" idx="0"/>
+            </p:cNvCxnSpPr>
+            <p:nvPr/>
+          </p:nvCxnSpPr>
+          <p:spPr>
+            <a:xfrm rot="5400000">
+              <a:off x="5883250" y="-1243378"/>
+              <a:ext cx="905874" cy="6692530"/>
+            </a:xfrm>
+            <a:prstGeom prst="bentConnector3">
+              <a:avLst>
+                <a:gd name="adj1" fmla="val 50000"/>
+              </a:avLst>
+            </a:prstGeom>
+            <a:ln w="28575">
+              <a:tailEnd type="triangle"/>
+            </a:ln>
+          </p:spPr>
+          <p:style>
+            <a:lnRef idx="1">
+              <a:schemeClr val="dk1"/>
+            </a:lnRef>
+            <a:fillRef idx="0">
+              <a:schemeClr val="dk1"/>
+            </a:fillRef>
+            <a:effectRef idx="0">
+              <a:schemeClr val="dk1"/>
+            </a:effectRef>
+            <a:fontRef idx="minor">
+              <a:schemeClr val="tx1"/>
+            </a:fontRef>
+          </p:style>
+        </p:cxnSp>
+        <p:cxnSp>
+          <p:nvCxnSpPr>
+            <p:cNvPr id="47" name="Elbow Connector 46">
+              <a:extLst>
+                <a:ext uri="{FF2B5EF4-FFF2-40B4-BE49-F238E27FC236}">
+                  <a16:creationId xmlns:a16="http://schemas.microsoft.com/office/drawing/2014/main" id="{4D4A430A-96FF-DD45-9105-5362341A1F6E}"/>
+                </a:ext>
+              </a:extLst>
+            </p:cNvPr>
+            <p:cNvCxnSpPr>
+              <a:cxnSpLocks/>
+              <a:stCxn id="20" idx="3"/>
+              <a:endCxn id="26" idx="1"/>
+            </p:cNvCxnSpPr>
+            <p:nvPr/>
+          </p:nvCxnSpPr>
+          <p:spPr>
+            <a:xfrm>
+              <a:off x="4380376" y="3155989"/>
+              <a:ext cx="3431266" cy="2602086"/>
+            </a:xfrm>
+            <a:prstGeom prst="bentConnector3">
+              <a:avLst>
+                <a:gd name="adj1" fmla="val 50000"/>
+              </a:avLst>
+            </a:prstGeom>
+            <a:ln w="28575">
+              <a:tailEnd type="triangle"/>
+            </a:ln>
+          </p:spPr>
+          <p:style>
+            <a:lnRef idx="1">
+              <a:schemeClr val="dk1"/>
+            </a:lnRef>
+            <a:fillRef idx="0">
+              <a:schemeClr val="dk1"/>
+            </a:fillRef>
+            <a:effectRef idx="0">
+              <a:schemeClr val="dk1"/>
+            </a:effectRef>
+            <a:fontRef idx="minor">
+              <a:schemeClr val="tx1"/>
+            </a:fontRef>
+          </p:style>
+        </p:cxnSp>
       </p:grpSp>
     </p:spTree>
     <p:extLst>

</xml_diff>